<commit_message>
added pvalues for network size
</commit_message>
<xml_diff>
--- a/plots/Summary_project.pptx
+++ b/plots/Summary_project.pptx
@@ -206,7 +206,7 @@
           <a:p>
             <a:fld id="{182A26AC-4CFD-4C4B-BCCD-B83F22EC439A}" type="datetimeFigureOut">
               <a:rPr lang="en-GB" smtClean="0"/>
-              <a:t>20/04/2023</a:t>
+              <a:t>21/04/2023</a:t>
             </a:fld>
             <a:endParaRPr lang="en-GB"/>
           </a:p>
@@ -1193,7 +1193,7 @@
           <a:p>
             <a:fld id="{6A9331EC-8641-4C7D-B8F2-52FC36CA7DB7}" type="datetimeFigureOut">
               <a:rPr lang="en-GB" smtClean="0"/>
-              <a:t>20/04/2023</a:t>
+              <a:t>21/04/2023</a:t>
             </a:fld>
             <a:endParaRPr lang="en-GB"/>
           </a:p>
@@ -1363,7 +1363,7 @@
           <a:p>
             <a:fld id="{6A9331EC-8641-4C7D-B8F2-52FC36CA7DB7}" type="datetimeFigureOut">
               <a:rPr lang="en-GB" smtClean="0"/>
-              <a:t>20/04/2023</a:t>
+              <a:t>21/04/2023</a:t>
             </a:fld>
             <a:endParaRPr lang="en-GB"/>
           </a:p>
@@ -1543,7 +1543,7 @@
           <a:p>
             <a:fld id="{6A9331EC-8641-4C7D-B8F2-52FC36CA7DB7}" type="datetimeFigureOut">
               <a:rPr lang="en-GB" smtClean="0"/>
-              <a:t>20/04/2023</a:t>
+              <a:t>21/04/2023</a:t>
             </a:fld>
             <a:endParaRPr lang="en-GB"/>
           </a:p>
@@ -1713,7 +1713,7 @@
           <a:p>
             <a:fld id="{6A9331EC-8641-4C7D-B8F2-52FC36CA7DB7}" type="datetimeFigureOut">
               <a:rPr lang="en-GB" smtClean="0"/>
-              <a:t>20/04/2023</a:t>
+              <a:t>21/04/2023</a:t>
             </a:fld>
             <a:endParaRPr lang="en-GB"/>
           </a:p>
@@ -1957,7 +1957,7 @@
           <a:p>
             <a:fld id="{6A9331EC-8641-4C7D-B8F2-52FC36CA7DB7}" type="datetimeFigureOut">
               <a:rPr lang="en-GB" smtClean="0"/>
-              <a:t>20/04/2023</a:t>
+              <a:t>21/04/2023</a:t>
             </a:fld>
             <a:endParaRPr lang="en-GB"/>
           </a:p>
@@ -2189,7 +2189,7 @@
           <a:p>
             <a:fld id="{6A9331EC-8641-4C7D-B8F2-52FC36CA7DB7}" type="datetimeFigureOut">
               <a:rPr lang="en-GB" smtClean="0"/>
-              <a:t>20/04/2023</a:t>
+              <a:t>21/04/2023</a:t>
             </a:fld>
             <a:endParaRPr lang="en-GB"/>
           </a:p>
@@ -2556,7 +2556,7 @@
           <a:p>
             <a:fld id="{6A9331EC-8641-4C7D-B8F2-52FC36CA7DB7}" type="datetimeFigureOut">
               <a:rPr lang="en-GB" smtClean="0"/>
-              <a:t>20/04/2023</a:t>
+              <a:t>21/04/2023</a:t>
             </a:fld>
             <a:endParaRPr lang="en-GB"/>
           </a:p>
@@ -2674,7 +2674,7 @@
           <a:p>
             <a:fld id="{6A9331EC-8641-4C7D-B8F2-52FC36CA7DB7}" type="datetimeFigureOut">
               <a:rPr lang="en-GB" smtClean="0"/>
-              <a:t>20/04/2023</a:t>
+              <a:t>21/04/2023</a:t>
             </a:fld>
             <a:endParaRPr lang="en-GB"/>
           </a:p>
@@ -2769,7 +2769,7 @@
           <a:p>
             <a:fld id="{6A9331EC-8641-4C7D-B8F2-52FC36CA7DB7}" type="datetimeFigureOut">
               <a:rPr lang="en-GB" smtClean="0"/>
-              <a:t>20/04/2023</a:t>
+              <a:t>21/04/2023</a:t>
             </a:fld>
             <a:endParaRPr lang="en-GB"/>
           </a:p>
@@ -3046,7 +3046,7 @@
           <a:p>
             <a:fld id="{6A9331EC-8641-4C7D-B8F2-52FC36CA7DB7}" type="datetimeFigureOut">
               <a:rPr lang="en-GB" smtClean="0"/>
-              <a:t>20/04/2023</a:t>
+              <a:t>21/04/2023</a:t>
             </a:fld>
             <a:endParaRPr lang="en-GB"/>
           </a:p>
@@ -3303,7 +3303,7 @@
           <a:p>
             <a:fld id="{6A9331EC-8641-4C7D-B8F2-52FC36CA7DB7}" type="datetimeFigureOut">
               <a:rPr lang="en-GB" smtClean="0"/>
-              <a:t>20/04/2023</a:t>
+              <a:t>21/04/2023</a:t>
             </a:fld>
             <a:endParaRPr lang="en-GB"/>
           </a:p>
@@ -3516,7 +3516,7 @@
           <a:p>
             <a:fld id="{6A9331EC-8641-4C7D-B8F2-52FC36CA7DB7}" type="datetimeFigureOut">
               <a:rPr lang="en-GB" smtClean="0"/>
-              <a:t>20/04/2023</a:t>
+              <a:t>21/04/2023</a:t>
             </a:fld>
             <a:endParaRPr lang="en-GB"/>
           </a:p>

</xml_diff>